<commit_message>
inserindo a apresentação editada para sprint 14
</commit_message>
<xml_diff>
--- a/Sprint-14 Análise Estatica/AutomaçãoAPICleartechSprint14.pptx
+++ b/Sprint-14 Análise Estatica/AutomaçãoAPICleartechSprint14.pptx
@@ -13,6 +13,7 @@
     <p:sldId id="260" r:id="rId8"/>
     <p:sldId id="261" r:id="rId9"/>
     <p:sldId id="262" r:id="rId10"/>
+    <p:sldId id="263" r:id="rId11"/>
   </p:sldIdLst>
   <p:sldSz cx="12192000" cy="6858000"/>
   <p:notesSz cx="7559675" cy="10691813"/>
@@ -3604,7 +3605,7 @@
         <p:spPr>
           <a:xfrm>
             <a:off x="10266840" y="6244920"/>
-            <a:ext cx="1573560" cy="360000"/>
+            <a:ext cx="1572840" cy="359280"/>
           </a:xfrm>
           <a:prstGeom prst="rect">
             <a:avLst/>
@@ -3627,7 +3628,7 @@
         <p:spPr>
           <a:xfrm>
             <a:off x="0" y="0"/>
-            <a:ext cx="12191400" cy="6857280"/>
+            <a:ext cx="12190680" cy="6856560"/>
           </a:xfrm>
           <a:prstGeom prst="rect">
             <a:avLst/>
@@ -3968,7 +3969,7 @@
         <p:spPr>
           <a:xfrm>
             <a:off x="0" y="0"/>
-            <a:ext cx="12191400" cy="6857280"/>
+            <a:ext cx="12190680" cy="6856560"/>
           </a:xfrm>
           <a:prstGeom prst="rect">
             <a:avLst/>
@@ -4298,7 +4299,7 @@
         <p:spPr>
           <a:xfrm>
             <a:off x="360000" y="1681920"/>
-            <a:ext cx="6378840" cy="1918080"/>
+            <a:ext cx="6378120" cy="1917360"/>
           </a:xfrm>
           <a:prstGeom prst="rect">
             <a:avLst/>
@@ -4334,11 +4335,14 @@
               </a:rPr>
               <a:t>Sprint 14 - Análise Estática</a:t>
             </a:r>
-            <a:endParaRPr b="0" lang="pt-BR" sz="4800" spc="-1" strike="noStrike">
-              <a:solidFill>
-                <a:srgbClr val="000000"/>
-              </a:solidFill>
-              <a:latin typeface="Arial"/>
+            <a:endParaRPr b="1" lang="pt-BR" sz="4800" spc="-1" strike="noStrike">
+              <a:solidFill>
+                <a:srgbClr val="ffff00"/>
+              </a:solidFill>
+              <a:highlight>
+                <a:srgbClr val="111111"/>
+              </a:highlight>
+              <a:latin typeface="Verdana"/>
             </a:endParaRPr>
           </a:p>
           <a:p>
@@ -4357,11 +4361,14 @@
               </a:rPr>
               <a:t>Cleartech</a:t>
             </a:r>
-            <a:endParaRPr b="0" lang="pt-BR" sz="4800" spc="-1" strike="noStrike">
-              <a:solidFill>
-                <a:srgbClr val="000000"/>
-              </a:solidFill>
-              <a:latin typeface="Arial"/>
+            <a:endParaRPr b="1" lang="pt-BR" sz="4800" spc="-1" strike="noStrike">
+              <a:solidFill>
+                <a:srgbClr val="ffff00"/>
+              </a:solidFill>
+              <a:highlight>
+                <a:srgbClr val="111111"/>
+              </a:highlight>
+              <a:latin typeface="Verdana"/>
             </a:endParaRPr>
           </a:p>
         </p:txBody>
@@ -4375,7 +4382,7 @@
         <p:spPr>
           <a:xfrm>
             <a:off x="7915680" y="6155640"/>
-            <a:ext cx="4395240" cy="333360"/>
+            <a:ext cx="4394520" cy="332640"/>
           </a:xfrm>
           <a:prstGeom prst="rect">
             <a:avLst/>
@@ -4411,11 +4418,14 @@
               </a:rPr>
               <a:t>Por: Gisele de Oliveira Christo Santos</a:t>
             </a:r>
-            <a:endParaRPr b="0" lang="pt-BR" sz="1600" spc="-1" strike="noStrike">
-              <a:solidFill>
-                <a:srgbClr val="000000"/>
-              </a:solidFill>
-              <a:latin typeface="Arial"/>
+            <a:endParaRPr b="1" lang="pt-BR" sz="1600" spc="-1" strike="noStrike">
+              <a:solidFill>
+                <a:srgbClr val="ffff00"/>
+              </a:solidFill>
+              <a:highlight>
+                <a:srgbClr val="111111"/>
+              </a:highlight>
+              <a:latin typeface="Verdana"/>
             </a:endParaRPr>
           </a:p>
         </p:txBody>
@@ -4429,7 +4439,7 @@
         <p:spPr>
           <a:xfrm>
             <a:off x="8170560" y="6494400"/>
-            <a:ext cx="3884760" cy="211680"/>
+            <a:ext cx="3884040" cy="210960"/>
           </a:xfrm>
           <a:prstGeom prst="rect">
             <a:avLst/>
@@ -4450,11 +4460,17 @@
             <a:noAutofit/>
           </a:bodyPr>
           <a:p>
+            <a:pPr>
+              <a:lnSpc>
+                <a:spcPct val="100000"/>
+              </a:lnSpc>
+            </a:pPr>
             <a:endParaRPr b="0" lang="pt-BR" sz="1800" spc="-1" strike="noStrike">
               <a:solidFill>
                 <a:srgbClr val="000000"/>
               </a:solidFill>
               <a:latin typeface="Arial"/>
+              <a:ea typeface="DejaVu Sans"/>
             </a:endParaRPr>
           </a:p>
         </p:txBody>
@@ -4498,7 +4514,7 @@
         <p:spPr>
           <a:xfrm>
             <a:off x="4127760" y="148320"/>
-            <a:ext cx="2887200" cy="1004400"/>
+            <a:ext cx="2886480" cy="1003680"/>
           </a:xfrm>
           <a:prstGeom prst="rect">
             <a:avLst/>
@@ -4537,14 +4553,14 @@
               </a:rPr>
               <a:t>Conceito</a:t>
             </a:r>
-            <a:endParaRPr b="0" lang="pt-BR" sz="6000" spc="-1" strike="noStrike">
-              <a:solidFill>
-                <a:srgbClr val="ffff00"/>
-              </a:solidFill>
-              <a:highlight>
-                <a:srgbClr val="111111"/>
-              </a:highlight>
-              <a:latin typeface="Arial"/>
+            <a:endParaRPr b="1" lang="pt-BR" sz="6000" spc="-1" strike="noStrike">
+              <a:solidFill>
+                <a:srgbClr val="ffff00"/>
+              </a:solidFill>
+              <a:highlight>
+                <a:srgbClr val="111111"/>
+              </a:highlight>
+              <a:latin typeface="Verdana"/>
             </a:endParaRPr>
           </a:p>
         </p:txBody>
@@ -4558,7 +4574,7 @@
         <p:spPr>
           <a:xfrm>
             <a:off x="5087880" y="6494400"/>
-            <a:ext cx="3884760" cy="211680"/>
+            <a:ext cx="3884040" cy="210960"/>
           </a:xfrm>
           <a:prstGeom prst="rect">
             <a:avLst/>
@@ -4585,7 +4601,7 @@
               </a:lnSpc>
             </a:pPr>
             <a:r>
-              <a:rPr b="0" lang="pt-BR" sz="800" spc="296" strike="noStrike">
+              <a:rPr b="0" lang="pt-BR" sz="800" spc="290" strike="noStrike">
                 <a:solidFill>
                   <a:srgbClr val="808080"/>
                 </a:solidFill>
@@ -4594,11 +4610,14 @@
               </a:rPr>
               <a:t>CLASSIFICAÇÃO: DOCUMENTO CONFIDENCIAL</a:t>
             </a:r>
-            <a:endParaRPr b="0" lang="pt-BR" sz="800" spc="-1" strike="noStrike">
-              <a:solidFill>
-                <a:srgbClr val="000000"/>
-              </a:solidFill>
-              <a:latin typeface="Arial"/>
+            <a:endParaRPr b="1" lang="pt-BR" sz="800" spc="-1" strike="noStrike">
+              <a:solidFill>
+                <a:srgbClr val="ffff00"/>
+              </a:solidFill>
+              <a:highlight>
+                <a:srgbClr val="111111"/>
+              </a:highlight>
+              <a:latin typeface="Verdana"/>
             </a:endParaRPr>
           </a:p>
         </p:txBody>
@@ -4612,7 +4631,7 @@
         <p:spPr>
           <a:xfrm>
             <a:off x="936720" y="1243800"/>
-            <a:ext cx="6093360" cy="10121760"/>
+            <a:ext cx="6092640" cy="10121040"/>
           </a:xfrm>
           <a:prstGeom prst="rect">
             <a:avLst/>
@@ -4658,11 +4677,14 @@
               </a:rPr>
               <a:t>Devido ao aumento das demandas de contratação de softwares pelo mercado está crescendo cada vez mais a necessidade do controle de qualidade que cada um entrega ao cliente final. </a:t>
             </a:r>
-            <a:endParaRPr b="0" lang="pt-BR" sz="2000" spc="-1" strike="noStrike">
-              <a:solidFill>
-                <a:srgbClr val="000000"/>
-              </a:solidFill>
-              <a:latin typeface="Arial"/>
+            <a:endParaRPr b="1" lang="pt-BR" sz="2000" spc="-1" strike="noStrike">
+              <a:solidFill>
+                <a:srgbClr val="ffff00"/>
+              </a:solidFill>
+              <a:highlight>
+                <a:srgbClr val="111111"/>
+              </a:highlight>
+              <a:latin typeface="Verdana"/>
             </a:endParaRPr>
           </a:p>
           <a:p>
@@ -4691,11 +4713,14 @@
               </a:rPr>
               <a:t>Mesmo tendo vários fatores para que seja desencadeado um determinado problema, a maioria ainda tem como principal causa a falha humana.</a:t>
             </a:r>
-            <a:endParaRPr b="0" lang="pt-BR" sz="2000" spc="-1" strike="noStrike">
-              <a:solidFill>
-                <a:srgbClr val="000000"/>
-              </a:solidFill>
-              <a:latin typeface="Arial"/>
+            <a:endParaRPr b="1" lang="pt-BR" sz="2000" spc="-1" strike="noStrike">
+              <a:solidFill>
+                <a:srgbClr val="ffff00"/>
+              </a:solidFill>
+              <a:highlight>
+                <a:srgbClr val="111111"/>
+              </a:highlight>
+              <a:latin typeface="Verdana"/>
             </a:endParaRPr>
           </a:p>
           <a:p>
@@ -4714,310 +4739,382 @@
               </a:rPr>
               <a:t>Para viabilizar o rastreio de tais falhas temos várias ferramentas, impedindo que  a maioria ocorra em ambienta de execução.</a:t>
             </a:r>
-            <a:endParaRPr b="0" lang="pt-BR" sz="2000" spc="-1" strike="noStrike">
-              <a:solidFill>
-                <a:srgbClr val="000000"/>
-              </a:solidFill>
-              <a:latin typeface="Arial"/>
-            </a:endParaRPr>
-          </a:p>
-          <a:p>
-            <a:pPr>
-              <a:lnSpc>
-                <a:spcPct val="100000"/>
-              </a:lnSpc>
-            </a:pPr>
-            <a:endParaRPr b="0" lang="pt-BR" sz="2000" spc="-1" strike="noStrike">
-              <a:solidFill>
-                <a:srgbClr val="000000"/>
-              </a:solidFill>
-              <a:latin typeface="Arial"/>
-            </a:endParaRPr>
-          </a:p>
-          <a:p>
-            <a:pPr>
-              <a:lnSpc>
-                <a:spcPct val="100000"/>
-              </a:lnSpc>
-            </a:pPr>
-            <a:endParaRPr b="0" lang="pt-BR" sz="2000" spc="-1" strike="noStrike">
-              <a:solidFill>
-                <a:srgbClr val="000000"/>
-              </a:solidFill>
-              <a:latin typeface="Arial"/>
-            </a:endParaRPr>
-          </a:p>
-          <a:p>
-            <a:pPr>
-              <a:lnSpc>
-                <a:spcPct val="100000"/>
-              </a:lnSpc>
-            </a:pPr>
-            <a:endParaRPr b="0" lang="pt-BR" sz="2000" spc="-1" strike="noStrike">
-              <a:solidFill>
-                <a:srgbClr val="000000"/>
-              </a:solidFill>
-              <a:latin typeface="Arial"/>
-            </a:endParaRPr>
-          </a:p>
-          <a:p>
-            <a:pPr>
-              <a:lnSpc>
-                <a:spcPct val="100000"/>
-              </a:lnSpc>
-            </a:pPr>
-            <a:endParaRPr b="0" lang="pt-BR" sz="2000" spc="-1" strike="noStrike">
-              <a:solidFill>
-                <a:srgbClr val="000000"/>
-              </a:solidFill>
-              <a:latin typeface="Arial"/>
-            </a:endParaRPr>
-          </a:p>
-          <a:p>
-            <a:pPr>
-              <a:lnSpc>
-                <a:spcPct val="100000"/>
-              </a:lnSpc>
-            </a:pPr>
-            <a:endParaRPr b="0" lang="pt-BR" sz="2000" spc="-1" strike="noStrike">
-              <a:solidFill>
-                <a:srgbClr val="000000"/>
-              </a:solidFill>
-              <a:latin typeface="Arial"/>
-            </a:endParaRPr>
-          </a:p>
-          <a:p>
-            <a:pPr>
-              <a:lnSpc>
-                <a:spcPct val="100000"/>
-              </a:lnSpc>
-            </a:pPr>
-            <a:endParaRPr b="0" lang="pt-BR" sz="2000" spc="-1" strike="noStrike">
-              <a:solidFill>
-                <a:srgbClr val="000000"/>
-              </a:solidFill>
-              <a:latin typeface="Arial"/>
-            </a:endParaRPr>
-          </a:p>
-          <a:p>
-            <a:pPr>
-              <a:lnSpc>
-                <a:spcPct val="100000"/>
-              </a:lnSpc>
-            </a:pPr>
-            <a:endParaRPr b="0" lang="pt-BR" sz="2000" spc="-1" strike="noStrike">
-              <a:solidFill>
-                <a:srgbClr val="000000"/>
-              </a:solidFill>
-              <a:latin typeface="Arial"/>
-            </a:endParaRPr>
-          </a:p>
-          <a:p>
-            <a:pPr>
-              <a:lnSpc>
-                <a:spcPct val="100000"/>
-              </a:lnSpc>
-            </a:pPr>
-            <a:endParaRPr b="0" lang="pt-BR" sz="2000" spc="-1" strike="noStrike">
-              <a:solidFill>
-                <a:srgbClr val="000000"/>
-              </a:solidFill>
-              <a:latin typeface="Arial"/>
-            </a:endParaRPr>
-          </a:p>
-          <a:p>
-            <a:pPr>
-              <a:lnSpc>
-                <a:spcPct val="100000"/>
-              </a:lnSpc>
-            </a:pPr>
-            <a:endParaRPr b="0" lang="pt-BR" sz="2000" spc="-1" strike="noStrike">
-              <a:solidFill>
-                <a:srgbClr val="000000"/>
-              </a:solidFill>
-              <a:latin typeface="Arial"/>
-            </a:endParaRPr>
-          </a:p>
-          <a:p>
-            <a:pPr>
-              <a:lnSpc>
-                <a:spcPct val="100000"/>
-              </a:lnSpc>
-            </a:pPr>
-            <a:endParaRPr b="0" lang="pt-BR" sz="2000" spc="-1" strike="noStrike">
-              <a:solidFill>
-                <a:srgbClr val="000000"/>
-              </a:solidFill>
-              <a:latin typeface="Arial"/>
-            </a:endParaRPr>
-          </a:p>
-          <a:p>
-            <a:pPr>
-              <a:lnSpc>
-                <a:spcPct val="100000"/>
-              </a:lnSpc>
-            </a:pPr>
-            <a:endParaRPr b="0" lang="pt-BR" sz="2000" spc="-1" strike="noStrike">
-              <a:solidFill>
-                <a:srgbClr val="000000"/>
-              </a:solidFill>
-              <a:latin typeface="Arial"/>
-            </a:endParaRPr>
-          </a:p>
-          <a:p>
-            <a:pPr>
-              <a:lnSpc>
-                <a:spcPct val="100000"/>
-              </a:lnSpc>
-            </a:pPr>
-            <a:endParaRPr b="0" lang="pt-BR" sz="2000" spc="-1" strike="noStrike">
-              <a:solidFill>
-                <a:srgbClr val="000000"/>
-              </a:solidFill>
-              <a:latin typeface="Arial"/>
-            </a:endParaRPr>
-          </a:p>
-          <a:p>
-            <a:pPr>
-              <a:lnSpc>
-                <a:spcPct val="100000"/>
-              </a:lnSpc>
-            </a:pPr>
-            <a:endParaRPr b="0" lang="pt-BR" sz="2000" spc="-1" strike="noStrike">
-              <a:solidFill>
-                <a:srgbClr val="000000"/>
-              </a:solidFill>
-              <a:latin typeface="Arial"/>
-            </a:endParaRPr>
-          </a:p>
-          <a:p>
-            <a:pPr>
-              <a:lnSpc>
-                <a:spcPct val="100000"/>
-              </a:lnSpc>
-            </a:pPr>
-            <a:endParaRPr b="0" lang="pt-BR" sz="2000" spc="-1" strike="noStrike">
-              <a:solidFill>
-                <a:srgbClr val="000000"/>
-              </a:solidFill>
-              <a:latin typeface="Arial"/>
-            </a:endParaRPr>
-          </a:p>
-          <a:p>
-            <a:pPr>
-              <a:lnSpc>
-                <a:spcPct val="100000"/>
-              </a:lnSpc>
-            </a:pPr>
-            <a:endParaRPr b="0" lang="pt-BR" sz="2000" spc="-1" strike="noStrike">
-              <a:solidFill>
-                <a:srgbClr val="000000"/>
-              </a:solidFill>
-              <a:latin typeface="Arial"/>
-            </a:endParaRPr>
-          </a:p>
-          <a:p>
-            <a:pPr>
-              <a:lnSpc>
-                <a:spcPct val="100000"/>
-              </a:lnSpc>
-            </a:pPr>
-            <a:endParaRPr b="0" lang="pt-BR" sz="2000" spc="-1" strike="noStrike">
-              <a:solidFill>
-                <a:srgbClr val="000000"/>
-              </a:solidFill>
-              <a:latin typeface="Arial"/>
-            </a:endParaRPr>
-          </a:p>
-          <a:p>
-            <a:pPr>
-              <a:lnSpc>
-                <a:spcPct val="100000"/>
-              </a:lnSpc>
-            </a:pPr>
-            <a:endParaRPr b="0" lang="pt-BR" sz="2000" spc="-1" strike="noStrike">
-              <a:solidFill>
-                <a:srgbClr val="000000"/>
-              </a:solidFill>
-              <a:latin typeface="Arial"/>
-            </a:endParaRPr>
-          </a:p>
-          <a:p>
-            <a:pPr>
-              <a:lnSpc>
-                <a:spcPct val="100000"/>
-              </a:lnSpc>
-            </a:pPr>
-            <a:endParaRPr b="0" lang="pt-BR" sz="2000" spc="-1" strike="noStrike">
-              <a:solidFill>
-                <a:srgbClr val="000000"/>
-              </a:solidFill>
-              <a:latin typeface="Arial"/>
-            </a:endParaRPr>
-          </a:p>
-          <a:p>
-            <a:pPr>
-              <a:lnSpc>
-                <a:spcPct val="100000"/>
-              </a:lnSpc>
-            </a:pPr>
-            <a:endParaRPr b="0" lang="pt-BR" sz="2000" spc="-1" strike="noStrike">
-              <a:solidFill>
-                <a:srgbClr val="000000"/>
-              </a:solidFill>
-              <a:latin typeface="Arial"/>
-            </a:endParaRPr>
-          </a:p>
-          <a:p>
-            <a:pPr>
-              <a:lnSpc>
-                <a:spcPct val="100000"/>
-              </a:lnSpc>
-            </a:pPr>
-            <a:endParaRPr b="0" lang="pt-BR" sz="2000" spc="-1" strike="noStrike">
-              <a:solidFill>
-                <a:srgbClr val="000000"/>
-              </a:solidFill>
-              <a:latin typeface="Arial"/>
-            </a:endParaRPr>
-          </a:p>
-          <a:p>
-            <a:pPr>
-              <a:lnSpc>
-                <a:spcPct val="100000"/>
-              </a:lnSpc>
-            </a:pPr>
-            <a:endParaRPr b="0" lang="pt-BR" sz="2000" spc="-1" strike="noStrike">
-              <a:solidFill>
-                <a:srgbClr val="000000"/>
-              </a:solidFill>
-              <a:latin typeface="Arial"/>
-            </a:endParaRPr>
-          </a:p>
-          <a:p>
-            <a:pPr>
-              <a:lnSpc>
-                <a:spcPct val="100000"/>
-              </a:lnSpc>
-            </a:pPr>
-            <a:endParaRPr b="0" lang="pt-BR" sz="2000" spc="-1" strike="noStrike">
-              <a:solidFill>
-                <a:srgbClr val="000000"/>
-              </a:solidFill>
-              <a:latin typeface="Arial"/>
-            </a:endParaRPr>
-          </a:p>
-          <a:p>
-            <a:pPr>
-              <a:lnSpc>
-                <a:spcPct val="100000"/>
-              </a:lnSpc>
-            </a:pPr>
-            <a:endParaRPr b="0" lang="pt-BR" sz="2000" spc="-1" strike="noStrike">
-              <a:solidFill>
-                <a:srgbClr val="000000"/>
-              </a:solidFill>
-              <a:latin typeface="Arial"/>
+            <a:endParaRPr b="1" lang="pt-BR" sz="2000" spc="-1" strike="noStrike">
+              <a:solidFill>
+                <a:srgbClr val="ffff00"/>
+              </a:solidFill>
+              <a:highlight>
+                <a:srgbClr val="111111"/>
+              </a:highlight>
+              <a:latin typeface="Verdana"/>
+            </a:endParaRPr>
+          </a:p>
+          <a:p>
+            <a:pPr>
+              <a:lnSpc>
+                <a:spcPct val="100000"/>
+              </a:lnSpc>
+            </a:pPr>
+            <a:endParaRPr b="1" lang="pt-BR" sz="2000" spc="-1" strike="noStrike">
+              <a:solidFill>
+                <a:srgbClr val="ffff00"/>
+              </a:solidFill>
+              <a:highlight>
+                <a:srgbClr val="111111"/>
+              </a:highlight>
+              <a:latin typeface="Verdana"/>
+            </a:endParaRPr>
+          </a:p>
+          <a:p>
+            <a:pPr>
+              <a:lnSpc>
+                <a:spcPct val="100000"/>
+              </a:lnSpc>
+            </a:pPr>
+            <a:endParaRPr b="1" lang="pt-BR" sz="2000" spc="-1" strike="noStrike">
+              <a:solidFill>
+                <a:srgbClr val="ffff00"/>
+              </a:solidFill>
+              <a:highlight>
+                <a:srgbClr val="111111"/>
+              </a:highlight>
+              <a:latin typeface="Verdana"/>
+            </a:endParaRPr>
+          </a:p>
+          <a:p>
+            <a:pPr>
+              <a:lnSpc>
+                <a:spcPct val="100000"/>
+              </a:lnSpc>
+            </a:pPr>
+            <a:endParaRPr b="1" lang="pt-BR" sz="2000" spc="-1" strike="noStrike">
+              <a:solidFill>
+                <a:srgbClr val="ffff00"/>
+              </a:solidFill>
+              <a:highlight>
+                <a:srgbClr val="111111"/>
+              </a:highlight>
+              <a:latin typeface="Verdana"/>
+            </a:endParaRPr>
+          </a:p>
+          <a:p>
+            <a:pPr>
+              <a:lnSpc>
+                <a:spcPct val="100000"/>
+              </a:lnSpc>
+            </a:pPr>
+            <a:endParaRPr b="1" lang="pt-BR" sz="2000" spc="-1" strike="noStrike">
+              <a:solidFill>
+                <a:srgbClr val="ffff00"/>
+              </a:solidFill>
+              <a:highlight>
+                <a:srgbClr val="111111"/>
+              </a:highlight>
+              <a:latin typeface="Verdana"/>
+            </a:endParaRPr>
+          </a:p>
+          <a:p>
+            <a:pPr>
+              <a:lnSpc>
+                <a:spcPct val="100000"/>
+              </a:lnSpc>
+            </a:pPr>
+            <a:endParaRPr b="1" lang="pt-BR" sz="2000" spc="-1" strike="noStrike">
+              <a:solidFill>
+                <a:srgbClr val="ffff00"/>
+              </a:solidFill>
+              <a:highlight>
+                <a:srgbClr val="111111"/>
+              </a:highlight>
+              <a:latin typeface="Verdana"/>
+            </a:endParaRPr>
+          </a:p>
+          <a:p>
+            <a:pPr>
+              <a:lnSpc>
+                <a:spcPct val="100000"/>
+              </a:lnSpc>
+            </a:pPr>
+            <a:endParaRPr b="1" lang="pt-BR" sz="2000" spc="-1" strike="noStrike">
+              <a:solidFill>
+                <a:srgbClr val="ffff00"/>
+              </a:solidFill>
+              <a:highlight>
+                <a:srgbClr val="111111"/>
+              </a:highlight>
+              <a:latin typeface="Verdana"/>
+            </a:endParaRPr>
+          </a:p>
+          <a:p>
+            <a:pPr>
+              <a:lnSpc>
+                <a:spcPct val="100000"/>
+              </a:lnSpc>
+            </a:pPr>
+            <a:endParaRPr b="1" lang="pt-BR" sz="2000" spc="-1" strike="noStrike">
+              <a:solidFill>
+                <a:srgbClr val="ffff00"/>
+              </a:solidFill>
+              <a:highlight>
+                <a:srgbClr val="111111"/>
+              </a:highlight>
+              <a:latin typeface="Verdana"/>
+            </a:endParaRPr>
+          </a:p>
+          <a:p>
+            <a:pPr>
+              <a:lnSpc>
+                <a:spcPct val="100000"/>
+              </a:lnSpc>
+            </a:pPr>
+            <a:endParaRPr b="1" lang="pt-BR" sz="2000" spc="-1" strike="noStrike">
+              <a:solidFill>
+                <a:srgbClr val="ffff00"/>
+              </a:solidFill>
+              <a:highlight>
+                <a:srgbClr val="111111"/>
+              </a:highlight>
+              <a:latin typeface="Verdana"/>
+            </a:endParaRPr>
+          </a:p>
+          <a:p>
+            <a:pPr>
+              <a:lnSpc>
+                <a:spcPct val="100000"/>
+              </a:lnSpc>
+            </a:pPr>
+            <a:endParaRPr b="1" lang="pt-BR" sz="2000" spc="-1" strike="noStrike">
+              <a:solidFill>
+                <a:srgbClr val="ffff00"/>
+              </a:solidFill>
+              <a:highlight>
+                <a:srgbClr val="111111"/>
+              </a:highlight>
+              <a:latin typeface="Verdana"/>
+            </a:endParaRPr>
+          </a:p>
+          <a:p>
+            <a:pPr>
+              <a:lnSpc>
+                <a:spcPct val="100000"/>
+              </a:lnSpc>
+            </a:pPr>
+            <a:endParaRPr b="1" lang="pt-BR" sz="2000" spc="-1" strike="noStrike">
+              <a:solidFill>
+                <a:srgbClr val="ffff00"/>
+              </a:solidFill>
+              <a:highlight>
+                <a:srgbClr val="111111"/>
+              </a:highlight>
+              <a:latin typeface="Verdana"/>
+            </a:endParaRPr>
+          </a:p>
+          <a:p>
+            <a:pPr>
+              <a:lnSpc>
+                <a:spcPct val="100000"/>
+              </a:lnSpc>
+            </a:pPr>
+            <a:endParaRPr b="1" lang="pt-BR" sz="2000" spc="-1" strike="noStrike">
+              <a:solidFill>
+                <a:srgbClr val="ffff00"/>
+              </a:solidFill>
+              <a:highlight>
+                <a:srgbClr val="111111"/>
+              </a:highlight>
+              <a:latin typeface="Verdana"/>
+            </a:endParaRPr>
+          </a:p>
+          <a:p>
+            <a:pPr>
+              <a:lnSpc>
+                <a:spcPct val="100000"/>
+              </a:lnSpc>
+            </a:pPr>
+            <a:endParaRPr b="1" lang="pt-BR" sz="2000" spc="-1" strike="noStrike">
+              <a:solidFill>
+                <a:srgbClr val="ffff00"/>
+              </a:solidFill>
+              <a:highlight>
+                <a:srgbClr val="111111"/>
+              </a:highlight>
+              <a:latin typeface="Verdana"/>
+            </a:endParaRPr>
+          </a:p>
+          <a:p>
+            <a:pPr>
+              <a:lnSpc>
+                <a:spcPct val="100000"/>
+              </a:lnSpc>
+            </a:pPr>
+            <a:endParaRPr b="1" lang="pt-BR" sz="2000" spc="-1" strike="noStrike">
+              <a:solidFill>
+                <a:srgbClr val="ffff00"/>
+              </a:solidFill>
+              <a:highlight>
+                <a:srgbClr val="111111"/>
+              </a:highlight>
+              <a:latin typeface="Verdana"/>
+            </a:endParaRPr>
+          </a:p>
+          <a:p>
+            <a:pPr>
+              <a:lnSpc>
+                <a:spcPct val="100000"/>
+              </a:lnSpc>
+            </a:pPr>
+            <a:endParaRPr b="1" lang="pt-BR" sz="2000" spc="-1" strike="noStrike">
+              <a:solidFill>
+                <a:srgbClr val="ffff00"/>
+              </a:solidFill>
+              <a:highlight>
+                <a:srgbClr val="111111"/>
+              </a:highlight>
+              <a:latin typeface="Verdana"/>
+            </a:endParaRPr>
+          </a:p>
+          <a:p>
+            <a:pPr>
+              <a:lnSpc>
+                <a:spcPct val="100000"/>
+              </a:lnSpc>
+            </a:pPr>
+            <a:endParaRPr b="1" lang="pt-BR" sz="2000" spc="-1" strike="noStrike">
+              <a:solidFill>
+                <a:srgbClr val="ffff00"/>
+              </a:solidFill>
+              <a:highlight>
+                <a:srgbClr val="111111"/>
+              </a:highlight>
+              <a:latin typeface="Verdana"/>
+            </a:endParaRPr>
+          </a:p>
+          <a:p>
+            <a:pPr>
+              <a:lnSpc>
+                <a:spcPct val="100000"/>
+              </a:lnSpc>
+            </a:pPr>
+            <a:endParaRPr b="1" lang="pt-BR" sz="2000" spc="-1" strike="noStrike">
+              <a:solidFill>
+                <a:srgbClr val="ffff00"/>
+              </a:solidFill>
+              <a:highlight>
+                <a:srgbClr val="111111"/>
+              </a:highlight>
+              <a:latin typeface="Verdana"/>
+            </a:endParaRPr>
+          </a:p>
+          <a:p>
+            <a:pPr>
+              <a:lnSpc>
+                <a:spcPct val="100000"/>
+              </a:lnSpc>
+            </a:pPr>
+            <a:endParaRPr b="1" lang="pt-BR" sz="2000" spc="-1" strike="noStrike">
+              <a:solidFill>
+                <a:srgbClr val="ffff00"/>
+              </a:solidFill>
+              <a:highlight>
+                <a:srgbClr val="111111"/>
+              </a:highlight>
+              <a:latin typeface="Verdana"/>
+            </a:endParaRPr>
+          </a:p>
+          <a:p>
+            <a:pPr>
+              <a:lnSpc>
+                <a:spcPct val="100000"/>
+              </a:lnSpc>
+            </a:pPr>
+            <a:endParaRPr b="1" lang="pt-BR" sz="2000" spc="-1" strike="noStrike">
+              <a:solidFill>
+                <a:srgbClr val="ffff00"/>
+              </a:solidFill>
+              <a:highlight>
+                <a:srgbClr val="111111"/>
+              </a:highlight>
+              <a:latin typeface="Verdana"/>
+            </a:endParaRPr>
+          </a:p>
+          <a:p>
+            <a:pPr>
+              <a:lnSpc>
+                <a:spcPct val="100000"/>
+              </a:lnSpc>
+            </a:pPr>
+            <a:endParaRPr b="1" lang="pt-BR" sz="2000" spc="-1" strike="noStrike">
+              <a:solidFill>
+                <a:srgbClr val="ffff00"/>
+              </a:solidFill>
+              <a:highlight>
+                <a:srgbClr val="111111"/>
+              </a:highlight>
+              <a:latin typeface="Verdana"/>
+            </a:endParaRPr>
+          </a:p>
+          <a:p>
+            <a:pPr>
+              <a:lnSpc>
+                <a:spcPct val="100000"/>
+              </a:lnSpc>
+            </a:pPr>
+            <a:endParaRPr b="1" lang="pt-BR" sz="2000" spc="-1" strike="noStrike">
+              <a:solidFill>
+                <a:srgbClr val="ffff00"/>
+              </a:solidFill>
+              <a:highlight>
+                <a:srgbClr val="111111"/>
+              </a:highlight>
+              <a:latin typeface="Verdana"/>
+            </a:endParaRPr>
+          </a:p>
+          <a:p>
+            <a:pPr>
+              <a:lnSpc>
+                <a:spcPct val="100000"/>
+              </a:lnSpc>
+            </a:pPr>
+            <a:endParaRPr b="1" lang="pt-BR" sz="2000" spc="-1" strike="noStrike">
+              <a:solidFill>
+                <a:srgbClr val="ffff00"/>
+              </a:solidFill>
+              <a:highlight>
+                <a:srgbClr val="111111"/>
+              </a:highlight>
+              <a:latin typeface="Verdana"/>
+            </a:endParaRPr>
+          </a:p>
+          <a:p>
+            <a:pPr>
+              <a:lnSpc>
+                <a:spcPct val="100000"/>
+              </a:lnSpc>
+            </a:pPr>
+            <a:endParaRPr b="1" lang="pt-BR" sz="2000" spc="-1" strike="noStrike">
+              <a:solidFill>
+                <a:srgbClr val="ffff00"/>
+              </a:solidFill>
+              <a:highlight>
+                <a:srgbClr val="111111"/>
+              </a:highlight>
+              <a:latin typeface="Verdana"/>
+            </a:endParaRPr>
+          </a:p>
+          <a:p>
+            <a:pPr>
+              <a:lnSpc>
+                <a:spcPct val="100000"/>
+              </a:lnSpc>
+            </a:pPr>
+            <a:endParaRPr b="1" lang="pt-BR" sz="2000" spc="-1" strike="noStrike">
+              <a:solidFill>
+                <a:srgbClr val="ffff00"/>
+              </a:solidFill>
+              <a:highlight>
+                <a:srgbClr val="111111"/>
+              </a:highlight>
+              <a:latin typeface="Verdana"/>
             </a:endParaRPr>
           </a:p>
         </p:txBody>
@@ -5031,7 +5128,7 @@
         <p:spPr>
           <a:xfrm>
             <a:off x="7030800" y="1582200"/>
-            <a:ext cx="6093360" cy="2224440"/>
+            <a:ext cx="6092640" cy="2223720"/>
           </a:xfrm>
           <a:prstGeom prst="rect">
             <a:avLst/>
@@ -5057,89 +5154,110 @@
                 <a:spcPct val="100000"/>
               </a:lnSpc>
             </a:pPr>
-            <a:endParaRPr b="0" lang="pt-BR" sz="1800" spc="-1" strike="noStrike">
-              <a:solidFill>
-                <a:srgbClr val="000000"/>
-              </a:solidFill>
-              <a:latin typeface="Arial"/>
-            </a:endParaRPr>
-          </a:p>
-          <a:p>
-            <a:pPr>
-              <a:lnSpc>
-                <a:spcPct val="100000"/>
-              </a:lnSpc>
-            </a:pPr>
-            <a:endParaRPr b="0" lang="pt-BR" sz="1800" spc="-1" strike="noStrike">
-              <a:solidFill>
-                <a:srgbClr val="000000"/>
-              </a:solidFill>
-              <a:latin typeface="Arial"/>
-            </a:endParaRPr>
-          </a:p>
-          <a:p>
-            <a:pPr>
-              <a:lnSpc>
-                <a:spcPct val="100000"/>
-              </a:lnSpc>
-            </a:pPr>
-            <a:endParaRPr b="0" lang="pt-BR" sz="1800" spc="-1" strike="noStrike">
-              <a:solidFill>
-                <a:srgbClr val="000000"/>
-              </a:solidFill>
-              <a:latin typeface="Arial"/>
-            </a:endParaRPr>
-          </a:p>
-          <a:p>
-            <a:pPr>
-              <a:lnSpc>
-                <a:spcPct val="100000"/>
-              </a:lnSpc>
-            </a:pPr>
-            <a:endParaRPr b="0" lang="pt-BR" sz="1800" spc="-1" strike="noStrike">
-              <a:solidFill>
-                <a:srgbClr val="000000"/>
-              </a:solidFill>
-              <a:latin typeface="Arial"/>
-            </a:endParaRPr>
-          </a:p>
-          <a:p>
-            <a:pPr>
-              <a:lnSpc>
-                <a:spcPct val="100000"/>
-              </a:lnSpc>
-            </a:pPr>
-            <a:endParaRPr b="0" lang="pt-BR" sz="1800" spc="-1" strike="noStrike">
-              <a:solidFill>
-                <a:srgbClr val="000000"/>
-              </a:solidFill>
-              <a:latin typeface="Arial"/>
-            </a:endParaRPr>
-          </a:p>
-          <a:p>
-            <a:pPr>
-              <a:lnSpc>
-                <a:spcPct val="100000"/>
-              </a:lnSpc>
-            </a:pPr>
-            <a:endParaRPr b="0" lang="pt-BR" sz="1800" spc="-1" strike="noStrike">
-              <a:solidFill>
-                <a:srgbClr val="000000"/>
-              </a:solidFill>
-              <a:latin typeface="Arial"/>
-            </a:endParaRPr>
-          </a:p>
-          <a:p>
-            <a:pPr>
-              <a:lnSpc>
-                <a:spcPct val="100000"/>
-              </a:lnSpc>
-            </a:pPr>
-            <a:endParaRPr b="0" lang="pt-BR" sz="1800" spc="-1" strike="noStrike">
-              <a:solidFill>
-                <a:srgbClr val="000000"/>
-              </a:solidFill>
-              <a:latin typeface="Arial"/>
+            <a:endParaRPr b="1" lang="pt-BR" sz="1800" spc="-1" strike="noStrike">
+              <a:solidFill>
+                <a:srgbClr val="ffff00"/>
+              </a:solidFill>
+              <a:highlight>
+                <a:srgbClr val="111111"/>
+              </a:highlight>
+              <a:latin typeface="Verdana"/>
+            </a:endParaRPr>
+          </a:p>
+          <a:p>
+            <a:pPr>
+              <a:lnSpc>
+                <a:spcPct val="100000"/>
+              </a:lnSpc>
+            </a:pPr>
+            <a:endParaRPr b="1" lang="pt-BR" sz="1800" spc="-1" strike="noStrike">
+              <a:solidFill>
+                <a:srgbClr val="ffff00"/>
+              </a:solidFill>
+              <a:highlight>
+                <a:srgbClr val="111111"/>
+              </a:highlight>
+              <a:latin typeface="Verdana"/>
+            </a:endParaRPr>
+          </a:p>
+          <a:p>
+            <a:pPr>
+              <a:lnSpc>
+                <a:spcPct val="100000"/>
+              </a:lnSpc>
+            </a:pPr>
+            <a:endParaRPr b="1" lang="pt-BR" sz="1800" spc="-1" strike="noStrike">
+              <a:solidFill>
+                <a:srgbClr val="ffff00"/>
+              </a:solidFill>
+              <a:highlight>
+                <a:srgbClr val="111111"/>
+              </a:highlight>
+              <a:latin typeface="Verdana"/>
+            </a:endParaRPr>
+          </a:p>
+          <a:p>
+            <a:pPr>
+              <a:lnSpc>
+                <a:spcPct val="100000"/>
+              </a:lnSpc>
+            </a:pPr>
+            <a:endParaRPr b="1" lang="pt-BR" sz="1800" spc="-1" strike="noStrike">
+              <a:solidFill>
+                <a:srgbClr val="ffff00"/>
+              </a:solidFill>
+              <a:highlight>
+                <a:srgbClr val="111111"/>
+              </a:highlight>
+              <a:latin typeface="Verdana"/>
+            </a:endParaRPr>
+          </a:p>
+          <a:p>
+            <a:pPr>
+              <a:lnSpc>
+                <a:spcPct val="100000"/>
+              </a:lnSpc>
+            </a:pPr>
+            <a:endParaRPr b="1" lang="pt-BR" sz="1800" spc="-1" strike="noStrike">
+              <a:solidFill>
+                <a:srgbClr val="ffff00"/>
+              </a:solidFill>
+              <a:highlight>
+                <a:srgbClr val="111111"/>
+              </a:highlight>
+              <a:latin typeface="Verdana"/>
+            </a:endParaRPr>
+          </a:p>
+          <a:p>
+            <a:pPr>
+              <a:lnSpc>
+                <a:spcPct val="100000"/>
+              </a:lnSpc>
+            </a:pPr>
+            <a:endParaRPr b="1" lang="pt-BR" sz="1800" spc="-1" strike="noStrike">
+              <a:solidFill>
+                <a:srgbClr val="ffff00"/>
+              </a:solidFill>
+              <a:highlight>
+                <a:srgbClr val="111111"/>
+              </a:highlight>
+              <a:latin typeface="Verdana"/>
+            </a:endParaRPr>
+          </a:p>
+          <a:p>
+            <a:pPr>
+              <a:lnSpc>
+                <a:spcPct val="100000"/>
+              </a:lnSpc>
+            </a:pPr>
+            <a:endParaRPr b="1" lang="pt-BR" sz="1800" spc="-1" strike="noStrike">
+              <a:solidFill>
+                <a:srgbClr val="ffff00"/>
+              </a:solidFill>
+              <a:highlight>
+                <a:srgbClr val="111111"/>
+              </a:highlight>
+              <a:latin typeface="Verdana"/>
             </a:endParaRPr>
           </a:p>
         </p:txBody>
@@ -5177,27 +5295,38 @@
       <p:sp>
         <p:nvSpPr>
           <p:cNvPr id="86" name=""/>
-          <p:cNvSpPr txBox="1"/>
+          <p:cNvSpPr/>
           <p:nvPr/>
         </p:nvSpPr>
         <p:spPr>
           <a:xfrm>
-            <a:off x="360000" y="360000"/>
-            <a:ext cx="7200000" cy="6351480"/>
-          </a:xfrm>
-          <a:prstGeom prst="rect">
-            <a:avLst/>
-          </a:prstGeom>
-          <a:noFill/>
-          <a:ln w="0">
-            <a:noFill/>
-          </a:ln>
-        </p:spPr>
+            <a:off x="360720" y="360000"/>
+            <a:ext cx="7199280" cy="6350760"/>
+          </a:xfrm>
+          <a:prstGeom prst="rect">
+            <a:avLst/>
+          </a:prstGeom>
+          <a:noFill/>
+          <a:ln w="0">
+            <a:noFill/>
+          </a:ln>
+        </p:spPr>
+        <p:style>
+          <a:lnRef idx="0"/>
+          <a:fillRef idx="0"/>
+          <a:effectRef idx="0"/>
+          <a:fontRef idx="minor"/>
+        </p:style>
         <p:txBody>
           <a:bodyPr lIns="90000" rIns="90000" tIns="45000" bIns="45000" anchor="t">
             <a:noAutofit/>
           </a:bodyPr>
           <a:p>
+            <a:pPr>
+              <a:lnSpc>
+                <a:spcPct val="100000"/>
+              </a:lnSpc>
+            </a:pPr>
             <a:r>
               <a:rPr b="1" lang="pt-BR" sz="2400" spc="-1" strike="noStrike">
                 <a:solidFill>
@@ -5211,22 +5340,38 @@
               </a:rPr>
               <a:t>Analise Estática</a:t>
             </a:r>
-            <a:endParaRPr b="0" lang="pt-BR" sz="2400" spc="-1" strike="noStrike">
-              <a:solidFill>
-                <a:srgbClr val="000000"/>
-              </a:solidFill>
-              <a:latin typeface="Arial"/>
-            </a:endParaRPr>
-          </a:p>
-          <a:p>
-            <a:endParaRPr b="0" lang="pt-BR" sz="2400" spc="-1" strike="noStrike">
-              <a:solidFill>
-                <a:srgbClr val="000000"/>
-              </a:solidFill>
-              <a:latin typeface="Arial"/>
-            </a:endParaRPr>
-          </a:p>
-          <a:p>
+            <a:endParaRPr b="1" lang="pt-BR" sz="2400" spc="-1" strike="noStrike">
+              <a:solidFill>
+                <a:srgbClr val="ffff00"/>
+              </a:solidFill>
+              <a:highlight>
+                <a:srgbClr val="111111"/>
+              </a:highlight>
+              <a:latin typeface="Verdana"/>
+            </a:endParaRPr>
+          </a:p>
+          <a:p>
+            <a:pPr>
+              <a:lnSpc>
+                <a:spcPct val="100000"/>
+              </a:lnSpc>
+            </a:pPr>
+            <a:endParaRPr b="1" lang="pt-BR" sz="2400" spc="-1" strike="noStrike">
+              <a:solidFill>
+                <a:srgbClr val="ffff00"/>
+              </a:solidFill>
+              <a:highlight>
+                <a:srgbClr val="111111"/>
+              </a:highlight>
+              <a:latin typeface="Verdana"/>
+            </a:endParaRPr>
+          </a:p>
+          <a:p>
+            <a:pPr>
+              <a:lnSpc>
+                <a:spcPct val="100000"/>
+              </a:lnSpc>
+            </a:pPr>
             <a:r>
               <a:rPr b="0" lang="pt-BR" sz="2100" spc="-1" strike="noStrike">
                 <a:solidFill>
@@ -5253,14 +5398,22 @@
               </a:rPr>
               <a:t>Para se ter um código de qualidade é necessário que  haja um processo de validação e verificação, e dentro deste processo temos a análise estática para inspecionar este código de maneira automatizada,enxergando falhas sem que o software esteja completamente desenvolvido e em execução, reduzindo custos  e otimizando processos.</a:t>
             </a:r>
-            <a:endParaRPr b="0" lang="pt-BR" sz="2100" spc="-1" strike="noStrike">
-              <a:solidFill>
-                <a:srgbClr val="000000"/>
-              </a:solidFill>
-              <a:latin typeface="Arial"/>
-            </a:endParaRPr>
-          </a:p>
-          <a:p>
+            <a:endParaRPr b="1" lang="pt-BR" sz="2100" spc="-1" strike="noStrike">
+              <a:solidFill>
+                <a:srgbClr val="ffff00"/>
+              </a:solidFill>
+              <a:highlight>
+                <a:srgbClr val="111111"/>
+              </a:highlight>
+              <a:latin typeface="Verdana"/>
+            </a:endParaRPr>
+          </a:p>
+          <a:p>
+            <a:pPr>
+              <a:lnSpc>
+                <a:spcPct val="100000"/>
+              </a:lnSpc>
+            </a:pPr>
             <a:r>
               <a:rPr b="0" lang="pt-BR" sz="2100" spc="-1" strike="noStrike">
                 <a:solidFill>
@@ -5287,67 +5440,126 @@
               </a:rPr>
               <a:t>Com a utilização da análise estática temos a redução de erros.</a:t>
             </a:r>
-            <a:endParaRPr b="0" lang="pt-BR" sz="2100" spc="-1" strike="noStrike">
-              <a:solidFill>
-                <a:srgbClr val="000000"/>
-              </a:solidFill>
-              <a:latin typeface="Arial"/>
-            </a:endParaRPr>
-          </a:p>
-          <a:p>
-            <a:endParaRPr b="0" lang="pt-BR" sz="2100" spc="-1" strike="noStrike">
-              <a:solidFill>
-                <a:srgbClr val="000000"/>
-              </a:solidFill>
-              <a:latin typeface="Arial"/>
-            </a:endParaRPr>
-          </a:p>
-          <a:p>
-            <a:endParaRPr b="0" lang="pt-BR" sz="2100" spc="-1" strike="noStrike">
-              <a:solidFill>
-                <a:srgbClr val="000000"/>
-              </a:solidFill>
-              <a:latin typeface="Arial"/>
-            </a:endParaRPr>
-          </a:p>
-          <a:p>
-            <a:endParaRPr b="0" lang="pt-BR" sz="2100" spc="-1" strike="noStrike">
-              <a:solidFill>
-                <a:srgbClr val="000000"/>
-              </a:solidFill>
-              <a:latin typeface="Arial"/>
-            </a:endParaRPr>
-          </a:p>
-          <a:p>
-            <a:endParaRPr b="0" lang="pt-BR" sz="2100" spc="-1" strike="noStrike">
-              <a:solidFill>
-                <a:srgbClr val="000000"/>
-              </a:solidFill>
-              <a:latin typeface="Arial"/>
-            </a:endParaRPr>
-          </a:p>
-          <a:p>
-            <a:endParaRPr b="0" lang="pt-BR" sz="2100" spc="-1" strike="noStrike">
-              <a:solidFill>
-                <a:srgbClr val="000000"/>
-              </a:solidFill>
-              <a:latin typeface="Arial"/>
-            </a:endParaRPr>
-          </a:p>
-          <a:p>
-            <a:endParaRPr b="0" lang="pt-BR" sz="2100" spc="-1" strike="noStrike">
-              <a:solidFill>
-                <a:srgbClr val="000000"/>
-              </a:solidFill>
-              <a:latin typeface="Arial"/>
-            </a:endParaRPr>
-          </a:p>
-          <a:p>
-            <a:endParaRPr b="0" lang="pt-BR" sz="2100" spc="-1" strike="noStrike">
-              <a:solidFill>
-                <a:srgbClr val="000000"/>
-              </a:solidFill>
-              <a:latin typeface="Arial"/>
+            <a:endParaRPr b="1" lang="pt-BR" sz="2100" spc="-1" strike="noStrike">
+              <a:solidFill>
+                <a:srgbClr val="ffff00"/>
+              </a:solidFill>
+              <a:highlight>
+                <a:srgbClr val="111111"/>
+              </a:highlight>
+              <a:latin typeface="Verdana"/>
+            </a:endParaRPr>
+          </a:p>
+          <a:p>
+            <a:pPr>
+              <a:lnSpc>
+                <a:spcPct val="100000"/>
+              </a:lnSpc>
+            </a:pPr>
+            <a:endParaRPr b="1" lang="pt-BR" sz="2100" spc="-1" strike="noStrike">
+              <a:solidFill>
+                <a:srgbClr val="ffff00"/>
+              </a:solidFill>
+              <a:highlight>
+                <a:srgbClr val="111111"/>
+              </a:highlight>
+              <a:latin typeface="Verdana"/>
+            </a:endParaRPr>
+          </a:p>
+          <a:p>
+            <a:pPr>
+              <a:lnSpc>
+                <a:spcPct val="100000"/>
+              </a:lnSpc>
+            </a:pPr>
+            <a:endParaRPr b="1" lang="pt-BR" sz="2100" spc="-1" strike="noStrike">
+              <a:solidFill>
+                <a:srgbClr val="ffff00"/>
+              </a:solidFill>
+              <a:highlight>
+                <a:srgbClr val="111111"/>
+              </a:highlight>
+              <a:latin typeface="Verdana"/>
+            </a:endParaRPr>
+          </a:p>
+          <a:p>
+            <a:pPr>
+              <a:lnSpc>
+                <a:spcPct val="100000"/>
+              </a:lnSpc>
+            </a:pPr>
+            <a:endParaRPr b="1" lang="pt-BR" sz="2100" spc="-1" strike="noStrike">
+              <a:solidFill>
+                <a:srgbClr val="ffff00"/>
+              </a:solidFill>
+              <a:highlight>
+                <a:srgbClr val="111111"/>
+              </a:highlight>
+              <a:latin typeface="Verdana"/>
+            </a:endParaRPr>
+          </a:p>
+          <a:p>
+            <a:pPr>
+              <a:lnSpc>
+                <a:spcPct val="100000"/>
+              </a:lnSpc>
+            </a:pPr>
+            <a:endParaRPr b="1" lang="pt-BR" sz="2100" spc="-1" strike="noStrike">
+              <a:solidFill>
+                <a:srgbClr val="ffff00"/>
+              </a:solidFill>
+              <a:highlight>
+                <a:srgbClr val="111111"/>
+              </a:highlight>
+              <a:latin typeface="Verdana"/>
+            </a:endParaRPr>
+          </a:p>
+          <a:p>
+            <a:pPr>
+              <a:lnSpc>
+                <a:spcPct val="100000"/>
+              </a:lnSpc>
+            </a:pPr>
+            <a:endParaRPr b="1" lang="pt-BR" sz="2100" spc="-1" strike="noStrike">
+              <a:solidFill>
+                <a:srgbClr val="ffff00"/>
+              </a:solidFill>
+              <a:highlight>
+                <a:srgbClr val="111111"/>
+              </a:highlight>
+              <a:latin typeface="Verdana"/>
+            </a:endParaRPr>
+          </a:p>
+          <a:p>
+            <a:pPr>
+              <a:lnSpc>
+                <a:spcPct val="100000"/>
+              </a:lnSpc>
+            </a:pPr>
+            <a:endParaRPr b="1" lang="pt-BR" sz="2100" spc="-1" strike="noStrike">
+              <a:solidFill>
+                <a:srgbClr val="ffff00"/>
+              </a:solidFill>
+              <a:highlight>
+                <a:srgbClr val="111111"/>
+              </a:highlight>
+              <a:latin typeface="Verdana"/>
+            </a:endParaRPr>
+          </a:p>
+          <a:p>
+            <a:pPr>
+              <a:lnSpc>
+                <a:spcPct val="100000"/>
+              </a:lnSpc>
+            </a:pPr>
+            <a:endParaRPr b="1" lang="pt-BR" sz="2100" spc="-1" strike="noStrike">
+              <a:solidFill>
+                <a:srgbClr val="ffff00"/>
+              </a:solidFill>
+              <a:highlight>
+                <a:srgbClr val="111111"/>
+              </a:highlight>
+              <a:latin typeface="Verdana"/>
             </a:endParaRPr>
           </a:p>
         </p:txBody>
@@ -5385,94 +5597,38 @@
       <p:sp>
         <p:nvSpPr>
           <p:cNvPr id="87" name=""/>
-          <p:cNvSpPr txBox="1"/>
+          <p:cNvSpPr/>
           <p:nvPr/>
         </p:nvSpPr>
         <p:spPr>
           <a:xfrm>
-            <a:off x="180000" y="540000"/>
-            <a:ext cx="12369600" cy="1370520"/>
-          </a:xfrm>
-          <a:prstGeom prst="rect">
-            <a:avLst/>
-          </a:prstGeom>
-          <a:noFill/>
-          <a:ln w="0">
-            <a:noFill/>
-          </a:ln>
-        </p:spPr>
+            <a:off x="360000" y="360000"/>
+            <a:ext cx="6819840" cy="3794400"/>
+          </a:xfrm>
+          <a:prstGeom prst="rect">
+            <a:avLst/>
+          </a:prstGeom>
+          <a:noFill/>
+          <a:ln w="0">
+            <a:noFill/>
+          </a:ln>
+        </p:spPr>
+        <p:style>
+          <a:lnRef idx="0"/>
+          <a:fillRef idx="0"/>
+          <a:effectRef idx="0"/>
+          <a:fontRef idx="minor"/>
+        </p:style>
         <p:txBody>
           <a:bodyPr lIns="90000" rIns="90000" tIns="45000" bIns="45000" anchor="t">
             <a:noAutofit/>
           </a:bodyPr>
           <a:p>
-            <a:r>
-              <a:rPr b="0" lang="pt-BR" sz="1800" spc="-1" strike="noStrike">
-                <a:solidFill>
-                  <a:srgbClr val="000000"/>
-                </a:solidFill>
-                <a:latin typeface="Arial"/>
-              </a:rPr>
-              <a:t>Conclusão.</a:t>
-            </a:r>
-            <a:endParaRPr b="0" lang="pt-BR" sz="1800" spc="-1" strike="noStrike">
-              <a:solidFill>
-                <a:srgbClr val="000000"/>
-              </a:solidFill>
-              <a:latin typeface="Arial"/>
-            </a:endParaRPr>
-          </a:p>
-          <a:p>
-            <a:endParaRPr b="0" lang="pt-BR" sz="1800" spc="-1" strike="noStrike">
-              <a:solidFill>
-                <a:srgbClr val="000000"/>
-              </a:solidFill>
-              <a:latin typeface="Arial"/>
-            </a:endParaRPr>
-          </a:p>
-          <a:p>
-            <a:r>
-              <a:rPr b="0" lang="pt-BR" sz="1800" spc="-1" strike="noStrike">
-                <a:solidFill>
-                  <a:srgbClr val="000000"/>
-                </a:solidFill>
-                <a:latin typeface="Arial"/>
-              </a:rPr>
-              <a:t>Paras  fazer uma entrega de qualidade sempre  se faz necessário  o  acompanhamento das entregas que são feitas, e a escolha de uma boa ferramanta garante a segurança necessária e através disso podemos obter  os relatórios que podem nos trazer feedbacks esperados com a precisão e agilidade sulficientes para garantir a eficiência desta entrega. </a:t>
-            </a:r>
-            <a:endParaRPr b="0" lang="pt-BR" sz="1800" spc="-1" strike="noStrike">
-              <a:solidFill>
-                <a:srgbClr val="000000"/>
-              </a:solidFill>
-              <a:latin typeface="Arial"/>
-            </a:endParaRPr>
-          </a:p>
-        </p:txBody>
-      </p:sp>
-      <p:sp>
-        <p:nvSpPr>
-          <p:cNvPr id="88" name=""/>
-          <p:cNvSpPr txBox="1"/>
-          <p:nvPr/>
-        </p:nvSpPr>
-        <p:spPr>
-          <a:xfrm>
-            <a:off x="708120" y="438840"/>
-            <a:ext cx="8831880" cy="4241160"/>
-          </a:xfrm>
-          <a:prstGeom prst="rect">
-            <a:avLst/>
-          </a:prstGeom>
-          <a:noFill/>
-          <a:ln w="0">
-            <a:noFill/>
-          </a:ln>
-        </p:spPr>
-        <p:txBody>
-          <a:bodyPr lIns="90000" rIns="90000" tIns="45000" bIns="45000" anchor="t">
-            <a:noAutofit/>
-          </a:bodyPr>
-          <a:p>
+            <a:pPr>
+              <a:lnSpc>
+                <a:spcPct val="100000"/>
+              </a:lnSpc>
+            </a:pPr>
             <a:r>
               <a:rPr b="1" lang="pt-BR" sz="2400" spc="-1" strike="noStrike">
                 <a:solidFill>
@@ -5484,26 +5640,26 @@
                 <a:latin typeface="Verdana"/>
                 <a:ea typeface="Verdana"/>
               </a:rPr>
-              <a:t>Code Smell</a:t>
+              <a:t>Benefícios da Analise estática</a:t>
             </a:r>
-            <a:endParaRPr b="0" lang="pt-BR" sz="2400" spc="-1" strike="noStrike">
-              <a:solidFill>
-                <a:srgbClr val="000000"/>
-              </a:solidFill>
-              <a:latin typeface="Arial"/>
-            </a:endParaRPr>
-          </a:p>
-          <a:p>
-            <a:endParaRPr b="0" lang="pt-BR" sz="2400" spc="-1" strike="noStrike">
-              <a:solidFill>
-                <a:srgbClr val="000000"/>
-              </a:solidFill>
-              <a:latin typeface="Arial"/>
-            </a:endParaRPr>
-          </a:p>
-          <a:p>
+            <a:endParaRPr b="1" lang="pt-BR" sz="2400" spc="-1" strike="noStrike">
+              <a:solidFill>
+                <a:srgbClr val="ffff00"/>
+              </a:solidFill>
+              <a:highlight>
+                <a:srgbClr val="111111"/>
+              </a:highlight>
+              <a:latin typeface="Verdana"/>
+            </a:endParaRPr>
+          </a:p>
+          <a:p>
+            <a:pPr>
+              <a:lnSpc>
+                <a:spcPct val="100000"/>
+              </a:lnSpc>
+            </a:pPr>
             <a:r>
-              <a:rPr b="0" lang="pt-BR" sz="2400" spc="-1" strike="noStrike">
+              <a:rPr b="0" lang="pt-BR" sz="2100" spc="-1" strike="noStrike">
                 <a:solidFill>
                   <a:srgbClr val="ffffff"/>
                 </a:solidFill>
@@ -5513,10 +5669,26 @@
                 <a:latin typeface="Verdana"/>
                 <a:ea typeface="Verdana"/>
               </a:rPr>
-              <a:t>	</a:t>
+              <a:t>Facilidade de encontrar erros</a:t>
             </a:r>
+            <a:endParaRPr b="1" lang="pt-BR" sz="2100" spc="-1" strike="noStrike">
+              <a:solidFill>
+                <a:srgbClr val="ffff00"/>
+              </a:solidFill>
+              <a:highlight>
+                <a:srgbClr val="111111"/>
+              </a:highlight>
+              <a:latin typeface="Verdana"/>
+            </a:endParaRPr>
+          </a:p>
+          <a:p>
+            <a:pPr>
+              <a:lnSpc>
+                <a:spcPct val="100000"/>
+              </a:lnSpc>
+            </a:pPr>
             <a:r>
-              <a:rPr b="0" lang="pt-BR" sz="2400" spc="-1" strike="noStrike">
+              <a:rPr b="0" lang="pt-BR" sz="2100" spc="-1" strike="noStrike">
                 <a:solidFill>
                   <a:srgbClr val="ffffff"/>
                 </a:solidFill>
@@ -5526,13 +5698,222 @@
                 <a:latin typeface="Verdana"/>
                 <a:ea typeface="Verdana"/>
               </a:rPr>
-              <a:t>O code smell significa o cheiro de codigo, ou seja de algo que precisa ser melhorado as falhas que são encontradas no sistema que são sempre a causa de outras falhas existentes  e que podem piiorar ainda mais a situação se não são resolvidas.</a:t>
+              <a:t>Visão objetiva de onde pode ter falhado.</a:t>
             </a:r>
-            <a:endParaRPr b="0" lang="pt-BR" sz="2400" spc="-1" strike="noStrike">
-              <a:solidFill>
-                <a:srgbClr val="000000"/>
-              </a:solidFill>
-              <a:latin typeface="Arial"/>
+            <a:endParaRPr b="1" lang="pt-BR" sz="2100" spc="-1" strike="noStrike">
+              <a:solidFill>
+                <a:srgbClr val="ffff00"/>
+              </a:solidFill>
+              <a:highlight>
+                <a:srgbClr val="111111"/>
+              </a:highlight>
+              <a:latin typeface="Verdana"/>
+            </a:endParaRPr>
+          </a:p>
+          <a:p>
+            <a:pPr>
+              <a:lnSpc>
+                <a:spcPct val="100000"/>
+              </a:lnSpc>
+            </a:pPr>
+            <a:r>
+              <a:rPr b="0" lang="pt-BR" sz="2100" spc="-1" strike="noStrike">
+                <a:solidFill>
+                  <a:srgbClr val="ffffff"/>
+                </a:solidFill>
+                <a:highlight>
+                  <a:srgbClr val="111111"/>
+                </a:highlight>
+                <a:latin typeface="Verdana"/>
+                <a:ea typeface="Verdana"/>
+              </a:rPr>
+              <a:t>Perspectiva diferente para facilitar estudos.</a:t>
+            </a:r>
+            <a:endParaRPr b="1" lang="pt-BR" sz="2100" spc="-1" strike="noStrike">
+              <a:solidFill>
+                <a:srgbClr val="ffff00"/>
+              </a:solidFill>
+              <a:highlight>
+                <a:srgbClr val="111111"/>
+              </a:highlight>
+              <a:latin typeface="Verdana"/>
+            </a:endParaRPr>
+          </a:p>
+          <a:p>
+            <a:pPr>
+              <a:lnSpc>
+                <a:spcPct val="100000"/>
+              </a:lnSpc>
+            </a:pPr>
+            <a:r>
+              <a:rPr b="0" lang="pt-BR" sz="2100" spc="-1" strike="noStrike">
+                <a:solidFill>
+                  <a:srgbClr val="ffffff"/>
+                </a:solidFill>
+                <a:highlight>
+                  <a:srgbClr val="111111"/>
+                </a:highlight>
+                <a:latin typeface="Verdana"/>
+                <a:ea typeface="Verdana"/>
+              </a:rPr>
+              <a:t>Foco em outros tipos de eficiencia, sabendo que eventuais erros são mitigados.</a:t>
+            </a:r>
+            <a:endParaRPr b="1" lang="pt-BR" sz="2100" spc="-1" strike="noStrike">
+              <a:solidFill>
+                <a:srgbClr val="ffff00"/>
+              </a:solidFill>
+              <a:highlight>
+                <a:srgbClr val="111111"/>
+              </a:highlight>
+              <a:latin typeface="Verdana"/>
+            </a:endParaRPr>
+          </a:p>
+          <a:p>
+            <a:pPr>
+              <a:lnSpc>
+                <a:spcPct val="100000"/>
+              </a:lnSpc>
+            </a:pPr>
+            <a:endParaRPr b="1" lang="pt-BR" sz="2100" spc="-1" strike="noStrike">
+              <a:solidFill>
+                <a:srgbClr val="ffff00"/>
+              </a:solidFill>
+              <a:highlight>
+                <a:srgbClr val="111111"/>
+              </a:highlight>
+              <a:latin typeface="Verdana"/>
+            </a:endParaRPr>
+          </a:p>
+          <a:p>
+            <a:pPr>
+              <a:lnSpc>
+                <a:spcPct val="100000"/>
+              </a:lnSpc>
+            </a:pPr>
+            <a:r>
+              <a:rPr b="1" lang="pt-BR" sz="2400" spc="-1" strike="noStrike">
+                <a:solidFill>
+                  <a:srgbClr val="ffff00"/>
+                </a:solidFill>
+                <a:highlight>
+                  <a:srgbClr val="111111"/>
+                </a:highlight>
+                <a:latin typeface="Verdana"/>
+                <a:ea typeface="Verdana"/>
+              </a:rPr>
+              <a:t>Algumas métricas medidas pela Analise estática</a:t>
+            </a:r>
+            <a:endParaRPr b="1" lang="pt-BR" sz="2400" spc="-1" strike="noStrike">
+              <a:solidFill>
+                <a:srgbClr val="ffff00"/>
+              </a:solidFill>
+              <a:highlight>
+                <a:srgbClr val="111111"/>
+              </a:highlight>
+              <a:latin typeface="Verdana"/>
+            </a:endParaRPr>
+          </a:p>
+          <a:p>
+            <a:pPr>
+              <a:lnSpc>
+                <a:spcPct val="100000"/>
+              </a:lnSpc>
+            </a:pPr>
+            <a:r>
+              <a:rPr b="0" lang="pt-BR" sz="2100" spc="-1" strike="noStrike">
+                <a:solidFill>
+                  <a:srgbClr val="ffffff"/>
+                </a:solidFill>
+                <a:highlight>
+                  <a:srgbClr val="111111"/>
+                </a:highlight>
+                <a:latin typeface="Verdana"/>
+                <a:ea typeface="Verdana"/>
+              </a:rPr>
+              <a:t>Números de linhas de código</a:t>
+            </a:r>
+            <a:endParaRPr b="1" lang="pt-BR" sz="2100" spc="-1" strike="noStrike">
+              <a:solidFill>
+                <a:srgbClr val="ffff00"/>
+              </a:solidFill>
+              <a:highlight>
+                <a:srgbClr val="111111"/>
+              </a:highlight>
+              <a:latin typeface="Verdana"/>
+            </a:endParaRPr>
+          </a:p>
+          <a:p>
+            <a:pPr>
+              <a:lnSpc>
+                <a:spcPct val="100000"/>
+              </a:lnSpc>
+            </a:pPr>
+            <a:r>
+              <a:rPr b="0" lang="pt-BR" sz="2100" spc="-1" strike="noStrike">
+                <a:solidFill>
+                  <a:srgbClr val="ffffff"/>
+                </a:solidFill>
+                <a:highlight>
+                  <a:srgbClr val="111111"/>
+                </a:highlight>
+                <a:latin typeface="Verdana"/>
+                <a:ea typeface="Verdana"/>
+              </a:rPr>
+              <a:t>Complexidade ciclomática</a:t>
+            </a:r>
+            <a:endParaRPr b="1" lang="pt-BR" sz="2100" spc="-1" strike="noStrike">
+              <a:solidFill>
+                <a:srgbClr val="ffff00"/>
+              </a:solidFill>
+              <a:highlight>
+                <a:srgbClr val="111111"/>
+              </a:highlight>
+              <a:latin typeface="Verdana"/>
+            </a:endParaRPr>
+          </a:p>
+          <a:p>
+            <a:pPr>
+              <a:lnSpc>
+                <a:spcPct val="100000"/>
+              </a:lnSpc>
+            </a:pPr>
+            <a:r>
+              <a:rPr b="0" lang="pt-BR" sz="2100" spc="-1" strike="noStrike">
+                <a:solidFill>
+                  <a:srgbClr val="ffffff"/>
+                </a:solidFill>
+                <a:highlight>
+                  <a:srgbClr val="111111"/>
+                </a:highlight>
+                <a:latin typeface="Verdana"/>
+                <a:ea typeface="Verdana"/>
+              </a:rPr>
+              <a:t>Falta de coesão em metodos.</a:t>
+            </a:r>
+            <a:endParaRPr b="1" lang="pt-BR" sz="2100" spc="-1" strike="noStrike">
+              <a:solidFill>
+                <a:srgbClr val="ffff00"/>
+              </a:solidFill>
+              <a:highlight>
+                <a:srgbClr val="111111"/>
+              </a:highlight>
+              <a:latin typeface="Verdana"/>
+            </a:endParaRPr>
+          </a:p>
+          <a:p>
+            <a:pPr>
+              <a:lnSpc>
+                <a:spcPct val="100000"/>
+              </a:lnSpc>
+            </a:pPr>
+            <a:endParaRPr b="1" lang="pt-BR" sz="2100" spc="-1" strike="noStrike">
+              <a:solidFill>
+                <a:srgbClr val="ffff00"/>
+              </a:solidFill>
+              <a:highlight>
+                <a:srgbClr val="111111"/>
+              </a:highlight>
+              <a:latin typeface="Verdana"/>
             </a:endParaRPr>
           </a:p>
         </p:txBody>
@@ -5567,53 +5948,41 @@
           <a:chExt cx="0" cy="0"/>
         </a:xfrm>
       </p:grpSpPr>
-      <p:pic>
-        <p:nvPicPr>
-          <p:cNvPr id="89" name="" descr=""/>
-          <p:cNvPicPr/>
+      <p:sp>
+        <p:nvSpPr>
+          <p:cNvPr id="88" name=""/>
+          <p:cNvSpPr/>
           <p:nvPr/>
-        </p:nvPicPr>
-        <p:blipFill>
-          <a:blip r:embed="rId1"/>
-          <a:stretch/>
-        </p:blipFill>
-        <p:spPr>
-          <a:xfrm>
-            <a:off x="1260000" y="1620000"/>
-            <a:ext cx="9000000" cy="3780000"/>
-          </a:xfrm>
-          <a:prstGeom prst="rect">
-            <a:avLst/>
-          </a:prstGeom>
-          <a:ln w="0">
-            <a:noFill/>
-          </a:ln>
-        </p:spPr>
-      </p:pic>
-      <p:sp>
-        <p:nvSpPr>
-          <p:cNvPr id="90" name=""/>
-          <p:cNvSpPr txBox="1"/>
-          <p:nvPr/>
-        </p:nvSpPr>
-        <p:spPr>
-          <a:xfrm>
-            <a:off x="2039040" y="900000"/>
-            <a:ext cx="5520960" cy="461160"/>
-          </a:xfrm>
-          <a:prstGeom prst="rect">
-            <a:avLst/>
-          </a:prstGeom>
-          <a:noFill/>
-          <a:ln w="0">
-            <a:noFill/>
-          </a:ln>
-        </p:spPr>
+        </p:nvSpPr>
+        <p:spPr>
+          <a:xfrm>
+            <a:off x="360000" y="360000"/>
+            <a:ext cx="6819840" cy="3794400"/>
+          </a:xfrm>
+          <a:prstGeom prst="rect">
+            <a:avLst/>
+          </a:prstGeom>
+          <a:noFill/>
+          <a:ln w="0">
+            <a:noFill/>
+          </a:ln>
+        </p:spPr>
+        <p:style>
+          <a:lnRef idx="0"/>
+          <a:fillRef idx="0"/>
+          <a:effectRef idx="0"/>
+          <a:fontRef idx="minor"/>
+        </p:style>
         <p:txBody>
           <a:bodyPr lIns="90000" rIns="90000" tIns="45000" bIns="45000" anchor="t">
             <a:noAutofit/>
           </a:bodyPr>
           <a:p>
+            <a:pPr>
+              <a:lnSpc>
+                <a:spcPct val="100000"/>
+              </a:lnSpc>
+            </a:pPr>
             <a:r>
               <a:rPr b="1" lang="pt-BR" sz="2400" spc="-1" strike="noStrike">
                 <a:solidFill>
@@ -5625,13 +5994,174 @@
                 <a:latin typeface="Verdana"/>
                 <a:ea typeface="Verdana"/>
               </a:rPr>
-              <a:t>Exemplo de code smell</a:t>
+              <a:t>Rules</a:t>
             </a:r>
-            <a:endParaRPr b="0" lang="pt-BR" sz="2400" spc="-1" strike="noStrike">
-              <a:solidFill>
-                <a:srgbClr val="000000"/>
-              </a:solidFill>
-              <a:latin typeface="Arial"/>
+            <a:endParaRPr b="1" lang="pt-BR" sz="2400" spc="-1" strike="noStrike">
+              <a:solidFill>
+                <a:srgbClr val="ffff00"/>
+              </a:solidFill>
+              <a:highlight>
+                <a:srgbClr val="111111"/>
+              </a:highlight>
+              <a:latin typeface="Verdana"/>
+            </a:endParaRPr>
+          </a:p>
+          <a:p>
+            <a:pPr>
+              <a:lnSpc>
+                <a:spcPct val="100000"/>
+              </a:lnSpc>
+            </a:pPr>
+            <a:r>
+              <a:rPr b="0" lang="pt-BR" sz="2100" spc="-1" strike="noStrike">
+                <a:solidFill>
+                  <a:srgbClr val="ffffff"/>
+                </a:solidFill>
+                <a:highlight>
+                  <a:srgbClr val="111111"/>
+                </a:highlight>
+                <a:latin typeface="Verdana"/>
+                <a:ea typeface="Verdana"/>
+              </a:rPr>
+              <a:t>	</a:t>
+            </a:r>
+            <a:r>
+              <a:rPr b="0" lang="pt-BR" sz="2100" spc="-1" strike="noStrike">
+                <a:solidFill>
+                  <a:srgbClr val="ffffff"/>
+                </a:solidFill>
+                <a:highlight>
+                  <a:srgbClr val="111111"/>
+                </a:highlight>
+                <a:latin typeface="Verdana"/>
+                <a:ea typeface="Verdana"/>
+              </a:rPr>
+              <a:t>Regras especificas de cada análise que encontra e categoriza os code smells.</a:t>
+            </a:r>
+            <a:endParaRPr b="1" lang="pt-BR" sz="2100" spc="-1" strike="noStrike">
+              <a:solidFill>
+                <a:srgbClr val="ffff00"/>
+              </a:solidFill>
+              <a:highlight>
+                <a:srgbClr val="111111"/>
+              </a:highlight>
+              <a:latin typeface="Verdana"/>
+            </a:endParaRPr>
+          </a:p>
+          <a:p>
+            <a:pPr>
+              <a:lnSpc>
+                <a:spcPct val="100000"/>
+              </a:lnSpc>
+            </a:pPr>
+            <a:r>
+              <a:rPr b="0" lang="pt-BR" sz="2100" spc="-1" strike="noStrike">
+                <a:solidFill>
+                  <a:srgbClr val="ffffff"/>
+                </a:solidFill>
+                <a:highlight>
+                  <a:srgbClr val="111111"/>
+                </a:highlight>
+                <a:latin typeface="Verdana"/>
+                <a:ea typeface="Verdana"/>
+              </a:rPr>
+              <a:t>Estas ferramentas possibilitam as empresas ativar e inativar estas regras ou ate mesmo inserir suas próprias regras se assim acharem necessário.</a:t>
+            </a:r>
+            <a:endParaRPr b="1" lang="pt-BR" sz="2100" spc="-1" strike="noStrike">
+              <a:solidFill>
+                <a:srgbClr val="ffff00"/>
+              </a:solidFill>
+              <a:highlight>
+                <a:srgbClr val="111111"/>
+              </a:highlight>
+              <a:latin typeface="Verdana"/>
+            </a:endParaRPr>
+          </a:p>
+          <a:p>
+            <a:pPr>
+              <a:lnSpc>
+                <a:spcPct val="100000"/>
+              </a:lnSpc>
+            </a:pPr>
+            <a:endParaRPr b="1" lang="pt-BR" sz="2100" spc="-1" strike="noStrike">
+              <a:solidFill>
+                <a:srgbClr val="ffff00"/>
+              </a:solidFill>
+              <a:highlight>
+                <a:srgbClr val="111111"/>
+              </a:highlight>
+              <a:latin typeface="Verdana"/>
+            </a:endParaRPr>
+          </a:p>
+          <a:p>
+            <a:pPr>
+              <a:lnSpc>
+                <a:spcPct val="100000"/>
+              </a:lnSpc>
+            </a:pPr>
+            <a:r>
+              <a:rPr b="1" lang="pt-BR" sz="2400" spc="-1" strike="noStrike">
+                <a:solidFill>
+                  <a:srgbClr val="ffff00"/>
+                </a:solidFill>
+                <a:highlight>
+                  <a:srgbClr val="111111"/>
+                </a:highlight>
+                <a:latin typeface="Verdana"/>
+                <a:ea typeface="Verdana"/>
+              </a:rPr>
+              <a:t>Code Smell</a:t>
+            </a:r>
+            <a:endParaRPr b="1" lang="pt-BR" sz="2400" spc="-1" strike="noStrike">
+              <a:solidFill>
+                <a:srgbClr val="ffff00"/>
+              </a:solidFill>
+              <a:highlight>
+                <a:srgbClr val="111111"/>
+              </a:highlight>
+              <a:latin typeface="Verdana"/>
+            </a:endParaRPr>
+          </a:p>
+          <a:p>
+            <a:pPr>
+              <a:lnSpc>
+                <a:spcPct val="100000"/>
+              </a:lnSpc>
+            </a:pPr>
+            <a:r>
+              <a:rPr b="0" lang="pt-BR" sz="2400" spc="-1" strike="noStrike">
+                <a:solidFill>
+                  <a:srgbClr val="ffffff"/>
+                </a:solidFill>
+                <a:highlight>
+                  <a:srgbClr val="111111"/>
+                </a:highlight>
+                <a:latin typeface="Verdana"/>
+                <a:ea typeface="Verdana"/>
+              </a:rPr>
+              <a:t>	</a:t>
+            </a:r>
+            <a:r>
+              <a:rPr b="0" lang="pt-BR" sz="2400" spc="-1" strike="noStrike">
+                <a:solidFill>
+                  <a:srgbClr val="ffffff"/>
+                </a:solidFill>
+                <a:highlight>
+                  <a:srgbClr val="111111"/>
+                </a:highlight>
+                <a:latin typeface="Verdana"/>
+                <a:ea typeface="Verdana"/>
+              </a:rPr>
+              <a:t>O code smell significa o cheiro de codigo, ou seja de algo que precisa ser melhorado as falhas que são encontradas no sistema que são sempre a causa de outras falhas existentes  e que podem piorar ainda mais a situação se não são resolvidas.</a:t>
+            </a:r>
+            <a:endParaRPr b="1" lang="pt-BR" sz="2400" spc="-1" strike="noStrike">
+              <a:solidFill>
+                <a:srgbClr val="ffff00"/>
+              </a:solidFill>
+              <a:highlight>
+                <a:srgbClr val="111111"/>
+              </a:highlight>
+              <a:latin typeface="Verdana"/>
             </a:endParaRPr>
           </a:p>
         </p:txBody>
@@ -5666,30 +6196,64 @@
           <a:chExt cx="0" cy="0"/>
         </a:xfrm>
       </p:grpSpPr>
-      <p:sp>
-        <p:nvSpPr>
-          <p:cNvPr id="91" name=""/>
-          <p:cNvSpPr txBox="1"/>
+      <p:pic>
+        <p:nvPicPr>
+          <p:cNvPr id="89" name="" descr=""/>
+          <p:cNvPicPr/>
           <p:nvPr/>
-        </p:nvSpPr>
-        <p:spPr>
-          <a:xfrm>
-            <a:off x="180000" y="720000"/>
-            <a:ext cx="9180000" cy="3424320"/>
-          </a:xfrm>
-          <a:prstGeom prst="rect">
-            <a:avLst/>
-          </a:prstGeom>
-          <a:noFill/>
-          <a:ln w="0">
-            <a:noFill/>
-          </a:ln>
-        </p:spPr>
+        </p:nvPicPr>
+        <p:blipFill>
+          <a:blip r:embed="rId1"/>
+          <a:stretch/>
+        </p:blipFill>
+        <p:spPr>
+          <a:xfrm>
+            <a:off x="1260000" y="1620000"/>
+            <a:ext cx="8999280" cy="3779280"/>
+          </a:xfrm>
+          <a:prstGeom prst="rect">
+            <a:avLst/>
+          </a:prstGeom>
+          <a:ln w="0">
+            <a:noFill/>
+          </a:ln>
+        </p:spPr>
+      </p:pic>
+      <p:sp>
+        <p:nvSpPr>
+          <p:cNvPr id="90" name=""/>
+          <p:cNvSpPr/>
+          <p:nvPr/>
+        </p:nvSpPr>
+        <p:spPr>
+          <a:xfrm>
+            <a:off x="2039040" y="900000"/>
+            <a:ext cx="5520240" cy="460440"/>
+          </a:xfrm>
+          <a:prstGeom prst="rect">
+            <a:avLst/>
+          </a:prstGeom>
+          <a:noFill/>
+          <a:ln w="0">
+            <a:noFill/>
+          </a:ln>
+        </p:spPr>
+        <p:style>
+          <a:lnRef idx="0"/>
+          <a:fillRef idx="0"/>
+          <a:effectRef idx="0"/>
+          <a:fontRef idx="minor"/>
+        </p:style>
         <p:txBody>
           <a:bodyPr lIns="90000" rIns="90000" tIns="45000" bIns="45000" anchor="t">
             <a:noAutofit/>
           </a:bodyPr>
           <a:p>
+            <a:pPr>
+              <a:lnSpc>
+                <a:spcPct val="100000"/>
+              </a:lnSpc>
+            </a:pPr>
             <a:r>
               <a:rPr b="1" lang="pt-BR" sz="2400" spc="-1" strike="noStrike">
                 <a:solidFill>
@@ -5701,55 +6265,16 @@
                 <a:latin typeface="Verdana"/>
                 <a:ea typeface="Verdana"/>
               </a:rPr>
-              <a:t>Conclusão.</a:t>
+              <a:t>Exemplo de code smell</a:t>
             </a:r>
-            <a:endParaRPr b="0" lang="pt-BR" sz="2400" spc="-1" strike="noStrike">
-              <a:solidFill>
-                <a:srgbClr val="000000"/>
-              </a:solidFill>
-              <a:latin typeface="Arial"/>
-            </a:endParaRPr>
-          </a:p>
-          <a:p>
-            <a:endParaRPr b="0" lang="pt-BR" sz="2400" spc="-1" strike="noStrike">
-              <a:solidFill>
-                <a:srgbClr val="000000"/>
-              </a:solidFill>
-              <a:latin typeface="Arial"/>
-            </a:endParaRPr>
-          </a:p>
-          <a:p>
-            <a:r>
-              <a:rPr b="0" lang="pt-BR" sz="2400" spc="-1" strike="noStrike">
-                <a:solidFill>
-                  <a:srgbClr val="ffffff"/>
-                </a:solidFill>
-                <a:highlight>
-                  <a:srgbClr val="111111"/>
-                </a:highlight>
-                <a:latin typeface="Verdana"/>
-                <a:ea typeface="Verdana"/>
-              </a:rPr>
-              <a:t>	</a:t>
-            </a:r>
-            <a:r>
-              <a:rPr b="0" lang="pt-BR" sz="2400" spc="-1" strike="noStrike">
-                <a:solidFill>
-                  <a:srgbClr val="ffffff"/>
-                </a:solidFill>
-                <a:highlight>
-                  <a:srgbClr val="111111"/>
-                </a:highlight>
-                <a:latin typeface="Verdana"/>
-                <a:ea typeface="Verdana"/>
-              </a:rPr>
-              <a:t>Para  fazer uma entrega de qualidade sempre  se faz necessário  o  acompanhamento das entregas que são feitas, e a escolha de uma boa ferramanta garante a segurança necessária e através disso podemos obter  os relatórios que podem nos trazer feedbacks esperados com a precisão e agilidade sulficientes para garantir a eficiência desta entrega. </a:t>
-            </a:r>
-            <a:endParaRPr b="0" lang="pt-BR" sz="2400" spc="-1" strike="noStrike">
-              <a:solidFill>
-                <a:srgbClr val="000000"/>
-              </a:solidFill>
-              <a:latin typeface="Arial"/>
+            <a:endParaRPr b="1" lang="pt-BR" sz="2400" spc="-1" strike="noStrike">
+              <a:solidFill>
+                <a:srgbClr val="ffff00"/>
+              </a:solidFill>
+              <a:highlight>
+                <a:srgbClr val="111111"/>
+              </a:highlight>
+              <a:latin typeface="Verdana"/>
             </a:endParaRPr>
           </a:p>
         </p:txBody>
@@ -5786,6 +6311,154 @@
       </p:grpSpPr>
       <p:sp>
         <p:nvSpPr>
+          <p:cNvPr id="91" name=""/>
+          <p:cNvSpPr/>
+          <p:nvPr/>
+        </p:nvSpPr>
+        <p:spPr>
+          <a:xfrm>
+            <a:off x="180000" y="720000"/>
+            <a:ext cx="9179280" cy="3423600"/>
+          </a:xfrm>
+          <a:prstGeom prst="rect">
+            <a:avLst/>
+          </a:prstGeom>
+          <a:noFill/>
+          <a:ln w="0">
+            <a:noFill/>
+          </a:ln>
+        </p:spPr>
+        <p:style>
+          <a:lnRef idx="0"/>
+          <a:fillRef idx="0"/>
+          <a:effectRef idx="0"/>
+          <a:fontRef idx="minor"/>
+        </p:style>
+        <p:txBody>
+          <a:bodyPr lIns="90000" rIns="90000" tIns="45000" bIns="45000" anchor="t">
+            <a:noAutofit/>
+          </a:bodyPr>
+          <a:p>
+            <a:pPr>
+              <a:lnSpc>
+                <a:spcPct val="100000"/>
+              </a:lnSpc>
+            </a:pPr>
+            <a:r>
+              <a:rPr b="1" lang="pt-BR" sz="2400" spc="-1" strike="noStrike">
+                <a:solidFill>
+                  <a:srgbClr val="ffff00"/>
+                </a:solidFill>
+                <a:highlight>
+                  <a:srgbClr val="111111"/>
+                </a:highlight>
+                <a:latin typeface="Verdana"/>
+                <a:ea typeface="Verdana"/>
+              </a:rPr>
+              <a:t>Conclusão.</a:t>
+            </a:r>
+            <a:endParaRPr b="1" lang="pt-BR" sz="2400" spc="-1" strike="noStrike">
+              <a:solidFill>
+                <a:srgbClr val="ffff00"/>
+              </a:solidFill>
+              <a:highlight>
+                <a:srgbClr val="111111"/>
+              </a:highlight>
+              <a:latin typeface="Verdana"/>
+            </a:endParaRPr>
+          </a:p>
+          <a:p>
+            <a:pPr>
+              <a:lnSpc>
+                <a:spcPct val="100000"/>
+              </a:lnSpc>
+            </a:pPr>
+            <a:endParaRPr b="1" lang="pt-BR" sz="2400" spc="-1" strike="noStrike">
+              <a:solidFill>
+                <a:srgbClr val="ffff00"/>
+              </a:solidFill>
+              <a:highlight>
+                <a:srgbClr val="111111"/>
+              </a:highlight>
+              <a:latin typeface="Verdana"/>
+            </a:endParaRPr>
+          </a:p>
+          <a:p>
+            <a:pPr>
+              <a:lnSpc>
+                <a:spcPct val="100000"/>
+              </a:lnSpc>
+            </a:pPr>
+            <a:r>
+              <a:rPr b="0" lang="pt-BR" sz="2400" spc="-1" strike="noStrike">
+                <a:solidFill>
+                  <a:srgbClr val="ffffff"/>
+                </a:solidFill>
+                <a:highlight>
+                  <a:srgbClr val="111111"/>
+                </a:highlight>
+                <a:latin typeface="Verdana"/>
+                <a:ea typeface="Verdana"/>
+              </a:rPr>
+              <a:t>	</a:t>
+            </a:r>
+            <a:r>
+              <a:rPr b="0" lang="pt-BR" sz="2400" spc="-1" strike="noStrike">
+                <a:solidFill>
+                  <a:srgbClr val="ffffff"/>
+                </a:solidFill>
+                <a:highlight>
+                  <a:srgbClr val="111111"/>
+                </a:highlight>
+                <a:latin typeface="Verdana"/>
+                <a:ea typeface="Verdana"/>
+              </a:rPr>
+              <a:t>Para  fazer uma entrega de qualidade sempre  se faz necessário  o  acompanhamento das entregas que são feitas, e a escolha de uma boa ferramenta garante a segurança necessária e através disso podemos obter  os relatórios que podem nos trazer feedbacks esperados com a precisão e agilidade sulficientes para garantir a eficiência desta entrega. </a:t>
+            </a:r>
+            <a:endParaRPr b="1" lang="pt-BR" sz="2400" spc="-1" strike="noStrike">
+              <a:solidFill>
+                <a:srgbClr val="ffff00"/>
+              </a:solidFill>
+              <a:highlight>
+                <a:srgbClr val="111111"/>
+              </a:highlight>
+              <a:latin typeface="Verdana"/>
+            </a:endParaRPr>
+          </a:p>
+        </p:txBody>
+      </p:sp>
+    </p:spTree>
+  </p:cSld>
+  <mc:AlternateContent>
+    <mc:Choice Requires="p14">
+      <p:transition spd="slow" p14:dur="2000"/>
+    </mc:Choice>
+    <mc:Fallback>
+      <p:transition spd="slow"/>
+    </mc:Fallback>
+  </mc:AlternateContent>
+</p:sld>
+</file>
+
+<file path=ppt/slides/slide8.xml><?xml version="1.0" encoding="utf-8"?>
+<p:sld xmlns:a="http://schemas.openxmlformats.org/drawingml/2006/main" xmlns:p="http://schemas.openxmlformats.org/presentationml/2006/main" xmlns:r="http://schemas.openxmlformats.org/officeDocument/2006/relationships" xmlns:p14="http://schemas.microsoft.com/office/powerpoint/2010/main" xmlns:p15="http://schemas.microsoft.com/office/powerpoint/2012/main" xmlns:mc="http://schemas.openxmlformats.org/markup-compatibility/2006">
+  <p:cSld>
+    <p:spTree>
+      <p:nvGrpSpPr>
+        <p:cNvPr id="1" name=""/>
+        <p:cNvGrpSpPr/>
+        <p:nvPr/>
+      </p:nvGrpSpPr>
+      <p:grpSpPr>
+        <a:xfrm>
+          <a:off x="0" y="0"/>
+          <a:ext cx="0" cy="0"/>
+          <a:chOff x="0" y="0"/>
+          <a:chExt cx="0" cy="0"/>
+        </a:xfrm>
+      </p:grpSpPr>
+      <p:sp>
+        <p:nvSpPr>
           <p:cNvPr id="92" name="CustomShape 1"/>
           <p:cNvSpPr/>
           <p:nvPr/>
@@ -5793,7 +6466,7 @@
         <p:spPr>
           <a:xfrm>
             <a:off x="2144520" y="2695320"/>
-            <a:ext cx="3321720" cy="1004400"/>
+            <a:ext cx="3321000" cy="1003680"/>
           </a:xfrm>
           <a:prstGeom prst="rect">
             <a:avLst/>
@@ -5829,11 +6502,14 @@
               </a:rPr>
               <a:t>Obrigada!</a:t>
             </a:r>
-            <a:endParaRPr b="0" lang="pt-BR" sz="6000" spc="-1" strike="noStrike">
-              <a:solidFill>
-                <a:srgbClr val="000000"/>
-              </a:solidFill>
-              <a:latin typeface="Arial"/>
+            <a:endParaRPr b="1" lang="pt-BR" sz="6000" spc="-1" strike="noStrike">
+              <a:solidFill>
+                <a:srgbClr val="ffff00"/>
+              </a:solidFill>
+              <a:highlight>
+                <a:srgbClr val="111111"/>
+              </a:highlight>
+              <a:latin typeface="Verdana"/>
             </a:endParaRPr>
           </a:p>
         </p:txBody>
@@ -5847,7 +6523,7 @@
         <p:spPr>
           <a:xfrm>
             <a:off x="7915680" y="6155640"/>
-            <a:ext cx="4395240" cy="333360"/>
+            <a:ext cx="4394520" cy="332640"/>
           </a:xfrm>
           <a:prstGeom prst="rect">
             <a:avLst/>
@@ -5883,11 +6559,14 @@
               </a:rPr>
               <a:t>Gisele de Oliveira Christo Santos</a:t>
             </a:r>
-            <a:endParaRPr b="0" lang="pt-BR" sz="1600" spc="-1" strike="noStrike">
-              <a:solidFill>
-                <a:srgbClr val="000000"/>
-              </a:solidFill>
-              <a:latin typeface="Arial"/>
+            <a:endParaRPr b="1" lang="pt-BR" sz="1600" spc="-1" strike="noStrike">
+              <a:solidFill>
+                <a:srgbClr val="ffff00"/>
+              </a:solidFill>
+              <a:highlight>
+                <a:srgbClr val="111111"/>
+              </a:highlight>
+              <a:latin typeface="Verdana"/>
             </a:endParaRPr>
           </a:p>
         </p:txBody>
@@ -5901,7 +6580,7 @@
         <p:spPr>
           <a:xfrm>
             <a:off x="8170560" y="6494400"/>
-            <a:ext cx="3884760" cy="211680"/>
+            <a:ext cx="3884040" cy="210960"/>
           </a:xfrm>
           <a:prstGeom prst="rect">
             <a:avLst/>
@@ -5928,7 +6607,7 @@
               </a:lnSpc>
             </a:pPr>
             <a:r>
-              <a:rPr b="0" lang="pt-BR" sz="800" spc="296" strike="noStrike">
+              <a:rPr b="0" lang="pt-BR" sz="800" spc="290" strike="noStrike">
                 <a:solidFill>
                   <a:srgbClr val="bfbfbf"/>
                 </a:solidFill>
@@ -5937,11 +6616,14 @@
               </a:rPr>
               <a:t>CLASSIFICAÇÃO: DOCUMENTO CONFIDENCIAL</a:t>
             </a:r>
-            <a:endParaRPr b="0" lang="pt-BR" sz="800" spc="-1" strike="noStrike">
-              <a:solidFill>
-                <a:srgbClr val="000000"/>
-              </a:solidFill>
-              <a:latin typeface="Arial"/>
+            <a:endParaRPr b="1" lang="pt-BR" sz="800" spc="-1" strike="noStrike">
+              <a:solidFill>
+                <a:srgbClr val="ffff00"/>
+              </a:solidFill>
+              <a:highlight>
+                <a:srgbClr val="111111"/>
+              </a:highlight>
+              <a:latin typeface="Verdana"/>
             </a:endParaRPr>
           </a:p>
         </p:txBody>

</xml_diff>